<commit_message>
Added block diagram figure to poster
</commit_message>
<xml_diff>
--- a/av3/rocketnet-hub/poster/RocketNetHub_Poster.pptx
+++ b/av3/rocketnet-hub/poster/RocketNetHub_Poster.pptx
@@ -3194,7 +3194,7 @@
         <p:spPr>
           <a:xfrm>
             <a:off x="2057400" y="4724400"/>
-            <a:ext cx="17526000" cy="5722263"/>
+            <a:ext cx="17526000" cy="5183654"/>
           </a:xfrm>
           <a:prstGeom prst="rect">
             <a:avLst/>
@@ -3211,28 +3211,31 @@
           <a:lstStyle/>
           <a:p>
             <a:r>
-              <a:rPr lang="en-US" b="1" dirty="0" smtClean="0">
+              <a:rPr lang="en-US" sz="8000" b="1" dirty="0" smtClean="0">
                 <a:latin typeface="Verdana" pitchFamily="34" charset="0"/>
               </a:rPr>
-              <a:t>Overview:</a:t>
-            </a:r>
-          </a:p>
-          <a:p>
-            <a:r>
-              <a:rPr lang="en-US" sz="4000" dirty="0" smtClean="0">
+              <a:t>Overview</a:t>
+            </a:r>
+            <a:endParaRPr lang="en-US" sz="8000" b="1" dirty="0" smtClean="0">
+              <a:latin typeface="Verdana" pitchFamily="34" charset="0"/>
+            </a:endParaRPr>
+          </a:p>
+          <a:p>
+            <a:r>
+              <a:rPr lang="en-US" sz="3600" dirty="0" smtClean="0">
                 <a:latin typeface="Verdana" pitchFamily="34" charset="0"/>
               </a:rPr>
               <a:t>Portland State Aerospace Society designs and builds rockets with the objective of someday putting a satellite in orbit. It is divided into many subgroups.  The avionics group is in charge of designing the brains of the rocket.</a:t>
             </a:r>
           </a:p>
           <a:p>
-            <a:endParaRPr lang="en-US" sz="4000" dirty="0">
+            <a:endParaRPr lang="en-US" sz="3600" dirty="0">
               <a:latin typeface="Verdana" pitchFamily="34" charset="0"/>
             </a:endParaRPr>
           </a:p>
           <a:p>
             <a:r>
-              <a:rPr lang="en-US" sz="4000" dirty="0" smtClean="0">
+              <a:rPr lang="en-US" sz="3600" dirty="0" smtClean="0">
                 <a:latin typeface="Verdana" pitchFamily="34" charset="0"/>
               </a:rPr>
               <a:t>The project requested by PSAS was to design and layout an up-to-date power and data distribution board.</a:t>
@@ -3498,7 +3501,7 @@
         </p:blipFill>
         <p:spPr>
           <a:xfrm>
-            <a:off x="2514600" y="19679223"/>
+            <a:off x="27946202" y="20377234"/>
             <a:ext cx="13354198" cy="8807366"/>
           </a:xfrm>
           <a:prstGeom prst="roundRect">
@@ -3527,8 +3530,8 @@
         </p:nvSpPr>
         <p:spPr>
           <a:xfrm>
-            <a:off x="22159252" y="4724400"/>
-            <a:ext cx="19642985" cy="4508927"/>
+            <a:off x="2057401" y="11201400"/>
+            <a:ext cx="18059400" cy="4093428"/>
           </a:xfrm>
           <a:prstGeom prst="rect">
             <a:avLst/>
@@ -3542,28 +3545,22 @@
           <a:lstStyle/>
           <a:p>
             <a:r>
-              <a:rPr lang="en-US" b="1" dirty="0">
+              <a:rPr lang="en-US" sz="8000" b="1" dirty="0" smtClean="0">
                 <a:latin typeface="Verdana" pitchFamily="34" charset="0"/>
               </a:rPr>
               <a:t>Requirements</a:t>
             </a:r>
-            <a:r>
-              <a:rPr lang="en-US" b="1" dirty="0" smtClean="0">
-                <a:latin typeface="Verdana" pitchFamily="34" charset="0"/>
-              </a:rPr>
-              <a:t>:</a:t>
-            </a:r>
-          </a:p>
-          <a:p>
-            <a:r>
-              <a:rPr lang="en-US" sz="4000" dirty="0" smtClean="0">
+            <a:endParaRPr lang="en-US" sz="8000" b="1" dirty="0" smtClean="0">
+              <a:latin typeface="Verdana" pitchFamily="34" charset="0"/>
+            </a:endParaRPr>
+          </a:p>
+          <a:p>
+            <a:r>
+              <a:rPr lang="en-US" sz="3600" dirty="0" smtClean="0">
                 <a:latin typeface="Verdana" pitchFamily="34" charset="0"/>
               </a:rPr>
               <a:t>The board should contain the following:</a:t>
             </a:r>
-            <a:endParaRPr lang="en-US" sz="4000" dirty="0" smtClean="0">
-              <a:latin typeface="Verdana" pitchFamily="34" charset="0"/>
-            </a:endParaRPr>
           </a:p>
           <a:p>
             <a:pPr marL="1143000" indent="-1143000">
@@ -3571,18 +3568,12 @@
               <a:buChar char="•"/>
             </a:pPr>
             <a:r>
-              <a:rPr lang="en-US" sz="4000" dirty="0" smtClean="0">
+              <a:rPr lang="en-US" sz="3600" dirty="0" smtClean="0">
                 <a:latin typeface="Verdana" pitchFamily="34" charset="0"/>
               </a:rPr>
-              <a:t>Support at </a:t>
-            </a:r>
-            <a:r>
-              <a:rPr lang="en-US" sz="4000" dirty="0" smtClean="0">
-                <a:latin typeface="Verdana" pitchFamily="34" charset="0"/>
-              </a:rPr>
-              <a:t>least 7 nodes</a:t>
-            </a:r>
-            <a:endParaRPr lang="en-US" sz="4000" dirty="0">
+              <a:t>Support at least 7 nodes</a:t>
+            </a:r>
+            <a:endParaRPr lang="en-US" sz="3600" dirty="0">
               <a:latin typeface="Verdana" pitchFamily="34" charset="0"/>
             </a:endParaRPr>
           </a:p>
@@ -3592,7 +3583,7 @@
               <a:buChar char="•"/>
             </a:pPr>
             <a:r>
-              <a:rPr lang="en-US" sz="4000" dirty="0" smtClean="0">
+              <a:rPr lang="en-US" sz="3600" dirty="0" smtClean="0">
                 <a:latin typeface="Verdana" pitchFamily="34" charset="0"/>
               </a:rPr>
               <a:t>Supply power with current-limited switches to each node</a:t>
@@ -3604,12 +3595,12 @@
               <a:buChar char="•"/>
             </a:pPr>
             <a:r>
-              <a:rPr lang="en-US" sz="4000" dirty="0" smtClean="0">
+              <a:rPr lang="en-US" sz="3600" dirty="0" smtClean="0">
                 <a:latin typeface="Verdana" pitchFamily="34" charset="0"/>
               </a:rPr>
               <a:t>Distribute data over 10/100 Ethernet</a:t>
             </a:r>
-            <a:endParaRPr lang="en-US" sz="4000" dirty="0">
+            <a:endParaRPr lang="en-US" sz="3600" dirty="0">
               <a:latin typeface="Verdana" pitchFamily="34" charset="0"/>
             </a:endParaRPr>
           </a:p>
@@ -3619,7 +3610,7 @@
               <a:buChar char="•"/>
             </a:pPr>
             <a:r>
-              <a:rPr lang="en-US" sz="4000" dirty="0" smtClean="0">
+              <a:rPr lang="en-US" sz="3600" dirty="0" smtClean="0">
                 <a:latin typeface="Verdana" pitchFamily="34" charset="0"/>
               </a:rPr>
               <a:t>Monitor and control sensors using a microcontroller</a:t>
@@ -3635,8 +3626,8 @@
         </p:nvSpPr>
         <p:spPr>
           <a:xfrm>
-            <a:off x="22131178" y="10439400"/>
-            <a:ext cx="17141199" cy="10664458"/>
+            <a:off x="21886661" y="4724400"/>
+            <a:ext cx="19108939" cy="9079409"/>
           </a:xfrm>
           <a:prstGeom prst="rect">
             <a:avLst/>
@@ -3650,15 +3641,18 @@
           <a:lstStyle/>
           <a:p>
             <a:r>
-              <a:rPr lang="en-US" b="1" dirty="0">
+              <a:rPr lang="en-US" sz="8000" b="1" dirty="0" smtClean="0">
                 <a:latin typeface="Verdana" pitchFamily="34" charset="0"/>
               </a:rPr>
-              <a:t>Design:</a:t>
-            </a:r>
-          </a:p>
-          <a:p>
-            <a:r>
-              <a:rPr lang="en-US" sz="4000" dirty="0">
+              <a:t>Design</a:t>
+            </a:r>
+            <a:endParaRPr lang="en-US" sz="8000" b="1" dirty="0">
+              <a:latin typeface="Verdana" pitchFamily="34" charset="0"/>
+            </a:endParaRPr>
+          </a:p>
+          <a:p>
+            <a:r>
+              <a:rPr lang="en-US" sz="3600" dirty="0">
                 <a:latin typeface="Verdana" pitchFamily="34" charset="0"/>
               </a:rPr>
               <a:t>Data/Ethernet:</a:t>
@@ -3666,41 +3660,41 @@
           </a:p>
           <a:p>
             <a:r>
-              <a:rPr lang="en-US" sz="4000" dirty="0">
+              <a:rPr lang="en-US" sz="3600" dirty="0">
                 <a:latin typeface="Verdana" pitchFamily="34" charset="0"/>
               </a:rPr>
               <a:t>The </a:t>
             </a:r>
             <a:r>
-              <a:rPr lang="en-US" sz="4000" dirty="0" err="1">
+              <a:rPr lang="en-US" sz="3600" dirty="0" err="1">
                 <a:latin typeface="Verdana" pitchFamily="34" charset="0"/>
               </a:rPr>
               <a:t>Micrel</a:t>
             </a:r>
             <a:r>
-              <a:rPr lang="en-US" sz="4000" dirty="0">
+              <a:rPr lang="en-US" sz="3600" dirty="0">
                 <a:latin typeface="Verdana" pitchFamily="34" charset="0"/>
               </a:rPr>
               <a:t> KS8999, while the largest IC on the board, contains a 9-port Ethernet switch.  It was </a:t>
             </a:r>
             <a:r>
-              <a:rPr lang="en-US" sz="4000" dirty="0" smtClean="0">
+              <a:rPr lang="en-US" sz="3600" dirty="0" smtClean="0">
                 <a:latin typeface="Verdana" pitchFamily="34" charset="0"/>
               </a:rPr>
               <a:t>picked to handle data communication because.</a:t>
             </a:r>
-            <a:endParaRPr lang="en-US" sz="4000" dirty="0">
+            <a:endParaRPr lang="en-US" sz="3600" dirty="0">
               <a:latin typeface="Verdana" pitchFamily="34" charset="0"/>
             </a:endParaRPr>
           </a:p>
           <a:p>
-            <a:endParaRPr lang="en-US" sz="4000" dirty="0">
+            <a:endParaRPr lang="en-US" sz="3600" dirty="0">
               <a:latin typeface="Verdana" pitchFamily="34" charset="0"/>
             </a:endParaRPr>
           </a:p>
           <a:p>
             <a:r>
-              <a:rPr lang="en-US" sz="4000" dirty="0">
+              <a:rPr lang="en-US" sz="3600" dirty="0">
                 <a:latin typeface="Verdana" pitchFamily="34" charset="0"/>
               </a:rPr>
               <a:t>Microcontroller:</a:t>
@@ -3708,29 +3702,29 @@
           </a:p>
           <a:p>
             <a:r>
-              <a:rPr lang="en-US" sz="4000" dirty="0">
+              <a:rPr lang="en-US" sz="3600" dirty="0">
                 <a:latin typeface="Verdana" pitchFamily="34" charset="0"/>
               </a:rPr>
               <a:t>STMicroelectronics STM32F407 was selected </a:t>
             </a:r>
             <a:r>
-              <a:rPr lang="en-US" sz="4000" dirty="0" smtClean="0">
+              <a:rPr lang="en-US" sz="3600" dirty="0" smtClean="0">
                 <a:latin typeface="Verdana" pitchFamily="34" charset="0"/>
               </a:rPr>
               <a:t>to bootstrap the on-board peripherals and monitor the status in-flight.</a:t>
             </a:r>
-            <a:endParaRPr lang="en-US" sz="4000" dirty="0">
+            <a:endParaRPr lang="en-US" sz="3600" dirty="0">
               <a:latin typeface="Verdana" pitchFamily="34" charset="0"/>
             </a:endParaRPr>
           </a:p>
           <a:p>
-            <a:endParaRPr lang="en-US" sz="4000" dirty="0" smtClean="0">
+            <a:endParaRPr lang="en-US" sz="3600" dirty="0" smtClean="0">
               <a:latin typeface="Verdana" pitchFamily="34" charset="0"/>
             </a:endParaRPr>
           </a:p>
           <a:p>
             <a:r>
-              <a:rPr lang="en-US" sz="4000" dirty="0" smtClean="0">
+              <a:rPr lang="en-US" sz="3600" dirty="0" smtClean="0">
                 <a:latin typeface="Verdana" pitchFamily="34" charset="0"/>
               </a:rPr>
               <a:t>Power Supply Regulation:</a:t>
@@ -3738,7 +3732,7 @@
           </a:p>
           <a:p>
             <a:r>
-              <a:rPr lang="en-US" sz="4000" dirty="0" smtClean="0">
+              <a:rPr lang="en-US" sz="3600" dirty="0" smtClean="0">
                 <a:latin typeface="Verdana" pitchFamily="34" charset="0"/>
               </a:rPr>
               <a:t>Linear Technology LTM8023 SPS was chosen….</a:t>
@@ -3746,26 +3740,26 @@
           </a:p>
           <a:p>
             <a:r>
-              <a:rPr lang="en-US" sz="4000" dirty="0" err="1" smtClean="0">
+              <a:rPr lang="en-US" sz="3600" dirty="0" err="1" smtClean="0">
                 <a:latin typeface="Verdana" pitchFamily="34" charset="0"/>
               </a:rPr>
               <a:t>Micrel</a:t>
             </a:r>
             <a:r>
-              <a:rPr lang="en-US" sz="4000" dirty="0" smtClean="0">
+              <a:rPr lang="en-US" sz="3600" dirty="0" smtClean="0">
                 <a:latin typeface="Verdana" pitchFamily="34" charset="0"/>
               </a:rPr>
               <a:t> 2V1 LDO was chosen…</a:t>
             </a:r>
           </a:p>
           <a:p>
-            <a:endParaRPr lang="en-US" sz="4000" dirty="0">
+            <a:endParaRPr lang="en-US" sz="3600" dirty="0">
               <a:latin typeface="Verdana" pitchFamily="34" charset="0"/>
             </a:endParaRPr>
           </a:p>
           <a:p>
             <a:r>
-              <a:rPr lang="en-US" sz="4000" dirty="0">
+              <a:rPr lang="en-US" sz="3600" dirty="0">
                 <a:latin typeface="Verdana" pitchFamily="34" charset="0"/>
               </a:rPr>
               <a:t>Current Protection:</a:t>
@@ -3773,18 +3767,18 @@
           </a:p>
           <a:p>
             <a:r>
-              <a:rPr lang="en-US" sz="4000" dirty="0">
+              <a:rPr lang="en-US" sz="3600" dirty="0">
                 <a:latin typeface="Verdana" pitchFamily="34" charset="0"/>
               </a:rPr>
               <a:t>Power protection is handled by TI TPS2420 current switches</a:t>
             </a:r>
             <a:r>
-              <a:rPr lang="en-US" sz="4000" dirty="0" smtClean="0">
+              <a:rPr lang="en-US" sz="3600" dirty="0" smtClean="0">
                 <a:latin typeface="Verdana" pitchFamily="34" charset="0"/>
               </a:rPr>
               <a:t>.</a:t>
             </a:r>
-            <a:endParaRPr lang="en-US" sz="4000" dirty="0">
+            <a:endParaRPr lang="en-US" sz="3600" dirty="0">
               <a:latin typeface="Verdana" pitchFamily="34" charset="0"/>
             </a:endParaRPr>
           </a:p>
@@ -3798,8 +3792,8 @@
         </p:nvSpPr>
         <p:spPr>
           <a:xfrm>
-            <a:off x="3581060" y="28486589"/>
-            <a:ext cx="11221277" cy="646331"/>
+            <a:off x="29012662" y="19699069"/>
+            <a:ext cx="11515973" cy="646331"/>
           </a:xfrm>
           <a:prstGeom prst="rect">
             <a:avLst/>
@@ -3813,18 +3807,34 @@
           <a:lstStyle/>
           <a:p>
             <a:r>
-              <a:rPr lang="en-US" sz="3600" dirty="0" smtClean="0"/>
+              <a:rPr lang="en-US" sz="3600" b="1" dirty="0" smtClean="0"/>
               <a:t>Layout of the </a:t>
             </a:r>
             <a:r>
-              <a:rPr lang="en-US" sz="3600" dirty="0" err="1" smtClean="0"/>
+              <a:rPr lang="en-US" sz="3600" b="1" dirty="0" err="1" smtClean="0"/>
               <a:t>RocketNet</a:t>
             </a:r>
             <a:r>
-              <a:rPr lang="en-US" sz="3600" dirty="0" smtClean="0"/>
-              <a:t> power and data distribution board</a:t>
-            </a:r>
-            <a:endParaRPr lang="en-US" sz="3600" dirty="0"/>
+              <a:rPr lang="en-US" sz="3600" b="1" dirty="0" smtClean="0"/>
+              <a:t> </a:t>
+            </a:r>
+            <a:r>
+              <a:rPr lang="en-US" sz="3600" b="1" dirty="0"/>
+              <a:t>P</a:t>
+            </a:r>
+            <a:r>
+              <a:rPr lang="en-US" sz="3600" b="1" dirty="0" smtClean="0"/>
+              <a:t>ower </a:t>
+            </a:r>
+            <a:r>
+              <a:rPr lang="en-US" sz="3600" b="1" dirty="0" smtClean="0"/>
+              <a:t>and </a:t>
+            </a:r>
+            <a:r>
+              <a:rPr lang="en-US" sz="3600" b="1" dirty="0" smtClean="0"/>
+              <a:t>Data Distribution Board</a:t>
+            </a:r>
+            <a:endParaRPr lang="en-US" sz="3600" b="1" dirty="0"/>
           </a:p>
         </p:txBody>
       </p:sp>
@@ -3863,6 +3873,77 @@
               <a:t>Eaglecad</a:t>
             </a:r>
             <a:endParaRPr lang="en-US" sz="3200" dirty="0"/>
+          </a:p>
+        </p:txBody>
+      </p:sp>
+      <p:pic>
+        <p:nvPicPr>
+          <p:cNvPr id="1028" name="Picture 4" descr="\\khensu\Home07\lunan\Desktop\blockdiagram.PNG"/>
+          <p:cNvPicPr>
+            <a:picLocks noChangeAspect="1" noChangeArrowheads="1"/>
+          </p:cNvPicPr>
+          <p:nvPr/>
+        </p:nvPicPr>
+        <p:blipFill>
+          <a:blip r:embed="rId5">
+            <a:extLst>
+              <a:ext uri="{28A0092B-C50C-407E-A947-70E740481C1C}">
+                <a14:useLocalDpi xmlns:a14="http://schemas.microsoft.com/office/drawing/2010/main" val="0"/>
+              </a:ext>
+            </a:extLst>
+          </a:blip>
+          <a:srcRect/>
+          <a:stretch>
+            <a:fillRect/>
+          </a:stretch>
+        </p:blipFill>
+        <p:spPr bwMode="auto">
+          <a:xfrm>
+            <a:off x="2286000" y="21336000"/>
+            <a:ext cx="13281275" cy="8458200"/>
+          </a:xfrm>
+          <a:prstGeom prst="rect">
+            <a:avLst/>
+          </a:prstGeom>
+          <a:noFill/>
+          <a:extLst>
+            <a:ext uri="{909E8E84-426E-40DD-AFC4-6F175D3DCCD1}">
+              <a14:hiddenFill xmlns:a14="http://schemas.microsoft.com/office/drawing/2010/main">
+                <a:solidFill>
+                  <a:srgbClr val="FFFFFF"/>
+                </a:solidFill>
+              </a14:hiddenFill>
+            </a:ext>
+          </a:extLst>
+        </p:spPr>
+      </p:pic>
+      <p:sp>
+        <p:nvSpPr>
+          <p:cNvPr id="20" name="TextBox 19"/>
+          <p:cNvSpPr txBox="1"/>
+          <p:nvPr/>
+        </p:nvSpPr>
+        <p:spPr>
+          <a:xfrm>
+            <a:off x="6407678" y="20345400"/>
+            <a:ext cx="5037918" cy="646331"/>
+          </a:xfrm>
+          <a:prstGeom prst="rect">
+            <a:avLst/>
+          </a:prstGeom>
+          <a:noFill/>
+        </p:spPr>
+        <p:txBody>
+          <a:bodyPr wrap="none" rtlCol="0">
+            <a:spAutoFit/>
+          </a:bodyPr>
+          <a:lstStyle/>
+          <a:p>
+            <a:r>
+              <a:rPr lang="en-US" sz="3600" b="1" dirty="0" smtClean="0"/>
+              <a:t>High-Level Block Diagram</a:t>
+            </a:r>
+            <a:endParaRPr lang="en-US" sz="3600" b="1" dirty="0"/>
           </a:p>
         </p:txBody>
       </p:sp>

</xml_diff>

<commit_message>
Added more text to poster
</commit_message>
<xml_diff>
--- a/av3/rocketnet-hub/poster/RocketNetHub_Poster.pptx
+++ b/av3/rocketnet-hub/poster/RocketNetHub_Poster.pptx
@@ -3082,7 +3082,7 @@
         </p:blipFill>
         <p:spPr bwMode="auto">
           <a:xfrm>
-            <a:off x="-4057115" y="-720608"/>
+            <a:off x="-4072355" y="-712725"/>
             <a:ext cx="53033435" cy="34359615"/>
           </a:xfrm>
           <a:prstGeom prst="rect">
@@ -3194,7 +3194,7 @@
         <p:spPr>
           <a:xfrm>
             <a:off x="2057400" y="4724400"/>
-            <a:ext cx="17526000" cy="5183654"/>
+            <a:ext cx="17526000" cy="6291650"/>
           </a:xfrm>
           <a:prstGeom prst="rect">
             <a:avLst/>
@@ -3216,16 +3216,25 @@
               </a:rPr>
               <a:t>Overview</a:t>
             </a:r>
-            <a:endParaRPr lang="en-US" sz="8000" b="1" dirty="0" smtClean="0">
-              <a:latin typeface="Verdana" pitchFamily="34" charset="0"/>
-            </a:endParaRPr>
           </a:p>
           <a:p>
             <a:r>
               <a:rPr lang="en-US" sz="3600" dirty="0" smtClean="0">
                 <a:latin typeface="Verdana" pitchFamily="34" charset="0"/>
               </a:rPr>
-              <a:t>Portland State Aerospace Society designs and builds rockets with the objective of someday putting a satellite in orbit. It is divided into many subgroups.  The avionics group is in charge of designing the brains of the rocket.</a:t>
+              <a:t>Portland State Aerospace </a:t>
+            </a:r>
+            <a:r>
+              <a:rPr lang="en-US" sz="3600" dirty="0" smtClean="0">
+                <a:latin typeface="Verdana" pitchFamily="34" charset="0"/>
+              </a:rPr>
+              <a:t>Society designs </a:t>
+            </a:r>
+            <a:r>
+              <a:rPr lang="en-US" sz="3600" dirty="0" smtClean="0">
+                <a:latin typeface="Verdana" pitchFamily="34" charset="0"/>
+              </a:rPr>
+              <a:t>and builds rockets with the objective of someday putting a satellite in orbit. It is divided into many subgroups.  The avionics group is in charge of designing the brains of the rocket.</a:t>
             </a:r>
           </a:p>
           <a:p>
@@ -3238,8 +3247,41 @@
               <a:rPr lang="en-US" sz="3600" dirty="0" smtClean="0">
                 <a:latin typeface="Verdana" pitchFamily="34" charset="0"/>
               </a:rPr>
-              <a:t>The project requested by PSAS was to design and layout an up-to-date power and data distribution board.</a:t>
-            </a:r>
+              <a:t>The project requested by PSAS was to design and layout an up-to-date power and data distribution board</a:t>
+            </a:r>
+            <a:r>
+              <a:rPr lang="en-US" sz="3600" dirty="0" smtClean="0">
+                <a:latin typeface="Verdana" pitchFamily="34" charset="0"/>
+              </a:rPr>
+              <a:t>.  This task required </a:t>
+            </a:r>
+            <a:r>
+              <a:rPr lang="en-US" sz="3600" dirty="0">
+                <a:latin typeface="Verdana" pitchFamily="34" charset="0"/>
+              </a:rPr>
+              <a:t>selecting </a:t>
+            </a:r>
+            <a:r>
+              <a:rPr lang="en-US" sz="3600" dirty="0" smtClean="0">
+                <a:latin typeface="Verdana" pitchFamily="34" charset="0"/>
+              </a:rPr>
+              <a:t>effective, yet cost-efficient </a:t>
+            </a:r>
+            <a:r>
+              <a:rPr lang="en-US" sz="3600" dirty="0">
+                <a:latin typeface="Verdana" pitchFamily="34" charset="0"/>
+              </a:rPr>
+              <a:t>components </a:t>
+            </a:r>
+            <a:r>
+              <a:rPr lang="en-US" sz="3600" dirty="0" smtClean="0">
+                <a:latin typeface="Verdana" pitchFamily="34" charset="0"/>
+              </a:rPr>
+              <a:t>including a switching power supply, Ethernet switch, and microcontroller.</a:t>
+            </a:r>
+            <a:endParaRPr lang="en-US" sz="3600" dirty="0" smtClean="0">
+              <a:latin typeface="Verdana" pitchFamily="34" charset="0"/>
+            </a:endParaRPr>
           </a:p>
         </p:txBody>
       </p:sp>
@@ -3417,16 +3459,9 @@
           </a:bodyPr>
           <a:lstStyle/>
           <a:p>
-            <a:r>
-              <a:rPr lang="en-US" sz="15800" dirty="0" smtClean="0">
-                <a:solidFill>
-                  <a:srgbClr val="6A7F10"/>
-                </a:solidFill>
-              </a:rPr>
-              <a:t>	</a:t>
-            </a:r>
-            <a:r>
-              <a:rPr lang="en-US" sz="15800" b="1" dirty="0" smtClean="0">
+            <a:pPr algn="ctr"/>
+            <a:r>
+              <a:rPr lang="en-US" sz="15800" b="1" cap="small" dirty="0" smtClean="0">
                 <a:solidFill>
                   <a:srgbClr val="6A7F10"/>
                 </a:solidFill>
@@ -3435,7 +3470,7 @@
               <a:t>PSAS </a:t>
             </a:r>
             <a:r>
-              <a:rPr lang="en-US" sz="15800" b="1" dirty="0" err="1" smtClean="0">
+              <a:rPr lang="en-US" sz="15800" b="1" cap="small" dirty="0" err="1" smtClean="0">
                 <a:solidFill>
                   <a:srgbClr val="6A7F10"/>
                 </a:solidFill>
@@ -3444,7 +3479,7 @@
               <a:t>RocketNet</a:t>
             </a:r>
             <a:r>
-              <a:rPr lang="en-US" sz="15800" b="1" dirty="0" smtClean="0">
+              <a:rPr lang="en-US" sz="15800" b="1" cap="small" dirty="0" smtClean="0">
                 <a:solidFill>
                   <a:srgbClr val="6A7F10"/>
                 </a:solidFill>
@@ -3453,24 +3488,15 @@
               <a:t> </a:t>
             </a:r>
             <a:r>
-              <a:rPr lang="en-US" sz="15800" b="1" dirty="0" err="1" smtClean="0">
+              <a:rPr lang="en-US" sz="15800" b="1" cap="small" dirty="0" smtClean="0">
                 <a:solidFill>
                   <a:srgbClr val="6A7F10"/>
                 </a:solidFill>
                 <a:latin typeface="Garamond" pitchFamily="18" charset="0"/>
               </a:rPr>
-              <a:t>Hub|Capstone</a:t>
-            </a:r>
-            <a:r>
-              <a:rPr lang="en-US" sz="15800" b="1" dirty="0" smtClean="0">
-                <a:solidFill>
-                  <a:srgbClr val="6A7F10"/>
-                </a:solidFill>
-                <a:latin typeface="Garamond" pitchFamily="18" charset="0"/>
-              </a:rPr>
-              <a:t> 2012-2013</a:t>
-            </a:r>
-            <a:endParaRPr lang="en-US" sz="15800" b="1" dirty="0">
+              <a:t>Hub || Capstone 2012-2013</a:t>
+            </a:r>
+            <a:endParaRPr lang="en-US" sz="15800" b="1" cap="small" dirty="0">
               <a:solidFill>
                 <a:srgbClr val="6A7F10"/>
               </a:solidFill>
@@ -3530,8 +3556,8 @@
         </p:nvSpPr>
         <p:spPr>
           <a:xfrm>
-            <a:off x="2057401" y="11201400"/>
-            <a:ext cx="18059400" cy="4093428"/>
+            <a:off x="2057401" y="13107174"/>
+            <a:ext cx="18059400" cy="5201424"/>
           </a:xfrm>
           <a:prstGeom prst="rect">
             <a:avLst/>
@@ -3550,9 +3576,6 @@
               </a:rPr>
               <a:t>Requirements</a:t>
             </a:r>
-            <a:endParaRPr lang="en-US" sz="8000" b="1" dirty="0" smtClean="0">
-              <a:latin typeface="Verdana" pitchFamily="34" charset="0"/>
-            </a:endParaRPr>
           </a:p>
           <a:p>
             <a:r>
@@ -3571,7 +3594,19 @@
               <a:rPr lang="en-US" sz="3600" dirty="0" smtClean="0">
                 <a:latin typeface="Verdana" pitchFamily="34" charset="0"/>
               </a:rPr>
-              <a:t>Support at least 7 nodes</a:t>
+              <a:t>Support at least </a:t>
+            </a:r>
+            <a:r>
+              <a:rPr lang="en-US" sz="3600" dirty="0" smtClean="0">
+                <a:latin typeface="Verdana" pitchFamily="34" charset="0"/>
+              </a:rPr>
+              <a:t>seven independent </a:t>
+            </a:r>
+            <a:r>
+              <a:rPr lang="en-US" sz="3600" dirty="0" smtClean="0">
+                <a:latin typeface="Verdana" pitchFamily="34" charset="0"/>
+              </a:rPr>
+              <a:t>nodes</a:t>
             </a:r>
             <a:endParaRPr lang="en-US" sz="3600" dirty="0">
               <a:latin typeface="Verdana" pitchFamily="34" charset="0"/>
@@ -3613,7 +3648,40 @@
               <a:rPr lang="en-US" sz="3600" dirty="0" smtClean="0">
                 <a:latin typeface="Verdana" pitchFamily="34" charset="0"/>
               </a:rPr>
-              <a:t>Monitor and control sensors using a microcontroller</a:t>
+              <a:t>Monitor and control sensors using a </a:t>
+            </a:r>
+            <a:r>
+              <a:rPr lang="en-US" sz="3600" dirty="0" smtClean="0">
+                <a:latin typeface="Verdana" pitchFamily="34" charset="0"/>
+              </a:rPr>
+              <a:t>microcontroller</a:t>
+            </a:r>
+          </a:p>
+          <a:p>
+            <a:pPr marL="1143000" indent="-1143000">
+              <a:buFont typeface="Arial" pitchFamily="34" charset="0"/>
+              <a:buChar char="•"/>
+            </a:pPr>
+            <a:r>
+              <a:rPr lang="en-US" sz="3600" dirty="0" smtClean="0">
+                <a:latin typeface="Verdana" pitchFamily="34" charset="0"/>
+              </a:rPr>
+              <a:t>Low external component count for switching power supply</a:t>
+            </a:r>
+            <a:endParaRPr lang="en-US" sz="3600" dirty="0">
+              <a:latin typeface="Verdana" pitchFamily="34" charset="0"/>
+            </a:endParaRPr>
+          </a:p>
+          <a:p>
+            <a:pPr marL="1143000" indent="-1143000">
+              <a:buFont typeface="Arial" pitchFamily="34" charset="0"/>
+              <a:buChar char="•"/>
+            </a:pPr>
+            <a:r>
+              <a:rPr lang="en-US" sz="3600" dirty="0" smtClean="0">
+                <a:latin typeface="Verdana" pitchFamily="34" charset="0"/>
+              </a:rPr>
+              <a:t>Low-power consumption when in standby mode</a:t>
             </a:r>
           </a:p>
         </p:txBody>
@@ -3681,7 +3749,25 @@
               <a:rPr lang="en-US" sz="3600" dirty="0" smtClean="0">
                 <a:latin typeface="Verdana" pitchFamily="34" charset="0"/>
               </a:rPr>
-              <a:t>picked to handle data communication because.</a:t>
+              <a:t>picked to handle </a:t>
+            </a:r>
+            <a:r>
+              <a:rPr lang="en-US" sz="3600" dirty="0" smtClean="0">
+                <a:latin typeface="Verdana" pitchFamily="34" charset="0"/>
+              </a:rPr>
+              <a:t>the main data </a:t>
+            </a:r>
+            <a:r>
+              <a:rPr lang="en-US" sz="3600" dirty="0" smtClean="0">
+                <a:latin typeface="Verdana" pitchFamily="34" charset="0"/>
+              </a:rPr>
+              <a:t>communication </a:t>
+            </a:r>
+            <a:r>
+              <a:rPr lang="en-US" sz="3600" dirty="0" smtClean="0">
+                <a:latin typeface="Verdana" pitchFamily="34" charset="0"/>
+              </a:rPr>
+              <a:t>because…</a:t>
             </a:r>
             <a:endParaRPr lang="en-US" sz="3600" dirty="0">
               <a:latin typeface="Verdana" pitchFamily="34" charset="0"/>
@@ -3711,7 +3797,13 @@
               <a:rPr lang="en-US" sz="3600" dirty="0" smtClean="0">
                 <a:latin typeface="Verdana" pitchFamily="34" charset="0"/>
               </a:rPr>
-              <a:t>to bootstrap the on-board peripherals and monitor the status in-flight.</a:t>
+              <a:t>to bootstrap the on-board peripherals and monitor the status </a:t>
+            </a:r>
+            <a:r>
+              <a:rPr lang="en-US" sz="3600" dirty="0" smtClean="0">
+                <a:latin typeface="Verdana" pitchFamily="34" charset="0"/>
+              </a:rPr>
+              <a:t>in-flight…</a:t>
             </a:r>
             <a:endParaRPr lang="en-US" sz="3600" dirty="0">
               <a:latin typeface="Verdana" pitchFamily="34" charset="0"/>
@@ -3735,8 +3827,17 @@
               <a:rPr lang="en-US" sz="3600" dirty="0" smtClean="0">
                 <a:latin typeface="Verdana" pitchFamily="34" charset="0"/>
               </a:rPr>
-              <a:t>Linear Technology LTM8023 SPS was chosen….</a:t>
-            </a:r>
+              <a:t>Linear Technology LTM8023 SPS was chosen</a:t>
+            </a:r>
+            <a:r>
+              <a:rPr lang="en-US" sz="3600" dirty="0" smtClean="0">
+                <a:latin typeface="Verdana" pitchFamily="34" charset="0"/>
+              </a:rPr>
+              <a:t>…</a:t>
+            </a:r>
+            <a:endParaRPr lang="en-US" sz="3600" dirty="0" smtClean="0">
+              <a:latin typeface="Verdana" pitchFamily="34" charset="0"/>
+            </a:endParaRPr>
           </a:p>
           <a:p>
             <a:r>
@@ -3793,7 +3894,7 @@
         <p:spPr>
           <a:xfrm>
             <a:off x="29012662" y="19699069"/>
-            <a:ext cx="11515973" cy="646331"/>
+            <a:ext cx="10357579" cy="646331"/>
           </a:xfrm>
           <a:prstGeom prst="rect">
             <a:avLst/>
@@ -3807,10 +3908,6 @@
           <a:lstStyle/>
           <a:p>
             <a:r>
-              <a:rPr lang="en-US" sz="3600" b="1" dirty="0" smtClean="0"/>
-              <a:t>Layout of the </a:t>
-            </a:r>
-            <a:r>
               <a:rPr lang="en-US" sz="3600" b="1" dirty="0" err="1" smtClean="0"/>
               <a:t>RocketNet</a:t>
             </a:r>
@@ -3824,15 +3921,11 @@
             </a:r>
             <a:r>
               <a:rPr lang="en-US" sz="3600" b="1" dirty="0" smtClean="0"/>
-              <a:t>ower </a:t>
+              <a:t>ower and Data Distribution </a:t>
             </a:r>
             <a:r>
               <a:rPr lang="en-US" sz="3600" b="1" dirty="0" smtClean="0"/>
-              <a:t>and </a:t>
-            </a:r>
-            <a:r>
-              <a:rPr lang="en-US" sz="3600" b="1" dirty="0" smtClean="0"/>
-              <a:t>Data Distribution Board</a:t>
+              <a:t>Board Layout</a:t>
             </a:r>
             <a:endParaRPr lang="en-US" sz="3600" b="1" dirty="0"/>
           </a:p>

</xml_diff>